<commit_message>
Downloaded files from CGC ran analysis
</commit_message>
<xml_diff>
--- a/GIPresentation.pptx
+++ b/GIPresentation.pptx
@@ -4431,7 +4431,17 @@
           <a:bodyPr/>
           <a:lstStyle/>
           <a:p>
-            <a:endParaRPr lang="en-US"/>
+            <a:r>
+              <a:rPr lang="en-US" dirty="0"/>
+              <a:t>Legend: (</a:t>
+            </a:r>
+            <a:r>
+              <a:rPr lang="en-US"/>
+              <a:t>match-mismatch-gap)</a:t>
+            </a:r>
+          </a:p>
+          <a:p>
+            <a:endParaRPr lang="en-US" dirty="0"/>
           </a:p>
         </p:txBody>
       </p:sp>

</xml_diff>